<commit_message>
binaries are so much more organized
</commit_message>
<xml_diff>
--- a/presentations/231101.pptx
+++ b/presentations/231101.pptx
@@ -106,6 +106,11 @@
       </a:defRPr>
     </a:lvl9pPr>
   </p:defaultTextStyle>
+  <p:extLst>
+    <p:ext uri="{EFAFB233-063F-42B5-8137-9DF3F51BA10A}">
+      <p15:sldGuideLst xmlns:p15="http://schemas.microsoft.com/office/powerpoint/2012/main"/>
+    </p:ext>
+  </p:extLst>
 </p:presentation>
 </file>
 
@@ -4236,8 +4241,15 @@
                 <a:latin typeface="Arial" panose="020B0604020202020204" pitchFamily="34" charset="0"/>
                 <a:cs typeface="Arial" panose="020B0604020202020204" pitchFamily="34" charset="0"/>
               </a:rPr>
-              <a:t>max: inf Hz </a:t>
-            </a:r>
+              <a:t>max: inf Hz (for some reason some samples have the same MATLAB time)</a:t>
+            </a:r>
+            <a:endParaRPr lang="en-US" sz="1600" dirty="0">
+              <a:solidFill>
+                <a:srgbClr val="333333"/>
+              </a:solidFill>
+              <a:latin typeface="Arial" panose="020B0604020202020204" pitchFamily="34" charset="0"/>
+              <a:cs typeface="Arial" panose="020B0604020202020204" pitchFamily="34" charset="0"/>
+            </a:endParaRPr>
           </a:p>
           <a:p>
             <a:endParaRPr lang="en-US" sz="1600" b="0" i="0" dirty="0">
@@ -4448,6 +4460,16 @@
               </a:rPr>
               <a:t>max: 5882.776329143213 Hz </a:t>
             </a:r>
+          </a:p>
+          <a:p>
+            <a:endParaRPr lang="en-US" sz="1600" b="0" i="0" dirty="0">
+              <a:solidFill>
+                <a:srgbClr val="333333"/>
+              </a:solidFill>
+              <a:effectLst/>
+              <a:latin typeface="Arial" panose="020B0604020202020204" pitchFamily="34" charset="0"/>
+              <a:cs typeface="Arial" panose="020B0604020202020204" pitchFamily="34" charset="0"/>
+            </a:endParaRPr>
           </a:p>
           <a:p>
             <a:endParaRPr lang="en-US" sz="1600" b="0" i="0" dirty="0">

</xml_diff>

<commit_message>
reorganize a bunch of stuff
</commit_message>
<xml_diff>
--- a/presentations/231101.pptx
+++ b/presentations/231101.pptx
@@ -261,7 +261,7 @@
           <a:p>
             <a:fld id="{DB3D4718-F915-004B-9F09-68AAF001912E}" type="datetimeFigureOut">
               <a:rPr lang="en-US" smtClean="0"/>
-              <a:t>11/1/23</a:t>
+              <a:t>11/2/2023</a:t>
             </a:fld>
             <a:endParaRPr lang="en-US"/>
           </a:p>
@@ -459,7 +459,7 @@
           <a:p>
             <a:fld id="{DB3D4718-F915-004B-9F09-68AAF001912E}" type="datetimeFigureOut">
               <a:rPr lang="en-US" smtClean="0"/>
-              <a:t>11/1/23</a:t>
+              <a:t>11/2/2023</a:t>
             </a:fld>
             <a:endParaRPr lang="en-US"/>
           </a:p>
@@ -667,7 +667,7 @@
           <a:p>
             <a:fld id="{DB3D4718-F915-004B-9F09-68AAF001912E}" type="datetimeFigureOut">
               <a:rPr lang="en-US" smtClean="0"/>
-              <a:t>11/1/23</a:t>
+              <a:t>11/2/2023</a:t>
             </a:fld>
             <a:endParaRPr lang="en-US"/>
           </a:p>
@@ -865,7 +865,7 @@
           <a:p>
             <a:fld id="{DB3D4718-F915-004B-9F09-68AAF001912E}" type="datetimeFigureOut">
               <a:rPr lang="en-US" smtClean="0"/>
-              <a:t>11/1/23</a:t>
+              <a:t>11/2/2023</a:t>
             </a:fld>
             <a:endParaRPr lang="en-US"/>
           </a:p>
@@ -1140,7 +1140,7 @@
           <a:p>
             <a:fld id="{DB3D4718-F915-004B-9F09-68AAF001912E}" type="datetimeFigureOut">
               <a:rPr lang="en-US" smtClean="0"/>
-              <a:t>11/1/23</a:t>
+              <a:t>11/2/2023</a:t>
             </a:fld>
             <a:endParaRPr lang="en-US"/>
           </a:p>
@@ -1405,7 +1405,7 @@
           <a:p>
             <a:fld id="{DB3D4718-F915-004B-9F09-68AAF001912E}" type="datetimeFigureOut">
               <a:rPr lang="en-US" smtClean="0"/>
-              <a:t>11/1/23</a:t>
+              <a:t>11/2/2023</a:t>
             </a:fld>
             <a:endParaRPr lang="en-US"/>
           </a:p>
@@ -1817,7 +1817,7 @@
           <a:p>
             <a:fld id="{DB3D4718-F915-004B-9F09-68AAF001912E}" type="datetimeFigureOut">
               <a:rPr lang="en-US" smtClean="0"/>
-              <a:t>11/1/23</a:t>
+              <a:t>11/2/2023</a:t>
             </a:fld>
             <a:endParaRPr lang="en-US"/>
           </a:p>
@@ -1958,7 +1958,7 @@
           <a:p>
             <a:fld id="{DB3D4718-F915-004B-9F09-68AAF001912E}" type="datetimeFigureOut">
               <a:rPr lang="en-US" smtClean="0"/>
-              <a:t>11/1/23</a:t>
+              <a:t>11/2/2023</a:t>
             </a:fld>
             <a:endParaRPr lang="en-US"/>
           </a:p>
@@ -2071,7 +2071,7 @@
           <a:p>
             <a:fld id="{DB3D4718-F915-004B-9F09-68AAF001912E}" type="datetimeFigureOut">
               <a:rPr lang="en-US" smtClean="0"/>
-              <a:t>11/1/23</a:t>
+              <a:t>11/2/2023</a:t>
             </a:fld>
             <a:endParaRPr lang="en-US"/>
           </a:p>
@@ -2382,7 +2382,7 @@
           <a:p>
             <a:fld id="{DB3D4718-F915-004B-9F09-68AAF001912E}" type="datetimeFigureOut">
               <a:rPr lang="en-US" smtClean="0"/>
-              <a:t>11/1/23</a:t>
+              <a:t>11/2/2023</a:t>
             </a:fld>
             <a:endParaRPr lang="en-US"/>
           </a:p>
@@ -2670,7 +2670,7 @@
           <a:p>
             <a:fld id="{DB3D4718-F915-004B-9F09-68AAF001912E}" type="datetimeFigureOut">
               <a:rPr lang="en-US" smtClean="0"/>
-              <a:t>11/1/23</a:t>
+              <a:t>11/2/2023</a:t>
             </a:fld>
             <a:endParaRPr lang="en-US"/>
           </a:p>
@@ -2911,7 +2911,7 @@
           <a:p>
             <a:fld id="{DB3D4718-F915-004B-9F09-68AAF001912E}" type="datetimeFigureOut">
               <a:rPr lang="en-US" smtClean="0"/>
-              <a:t>11/1/23</a:t>
+              <a:t>11/2/2023</a:t>
             </a:fld>
             <a:endParaRPr lang="en-US"/>
           </a:p>
@@ -3650,7 +3650,7 @@
         </p:nvSpPr>
         <p:spPr>
           <a:xfrm>
-            <a:off x="1394084" y="1492389"/>
+            <a:off x="1093549" y="6217244"/>
             <a:ext cx="4738979" cy="3394404"/>
           </a:xfrm>
           <a:prstGeom prst="rect">
@@ -3702,7 +3702,7 @@
         </p:nvSpPr>
         <p:spPr>
           <a:xfrm>
-            <a:off x="617104" y="1477399"/>
+            <a:off x="-1212999" y="1908747"/>
             <a:ext cx="776979" cy="3471854"/>
           </a:xfrm>
           <a:prstGeom prst="rect">
@@ -4193,29 +4193,7 @@
                 <a:latin typeface="Arial" panose="020B0604020202020204" pitchFamily="34" charset="0"/>
                 <a:cs typeface="Arial" panose="020B0604020202020204" pitchFamily="34" charset="0"/>
               </a:rPr>
-              <a:t>std of </a:t>
-            </a:r>
-            <a:r>
-              <a:rPr lang="en-US" sz="1600" b="0" i="0" dirty="0" err="1">
-                <a:solidFill>
-                  <a:srgbClr val="333333"/>
-                </a:solidFill>
-                <a:effectLst/>
-                <a:latin typeface="Arial" panose="020B0604020202020204" pitchFamily="34" charset="0"/>
-                <a:cs typeface="Arial" panose="020B0604020202020204" pitchFamily="34" charset="0"/>
-              </a:rPr>
-              <a:t>intersample</a:t>
-            </a:r>
-            <a:r>
-              <a:rPr lang="en-US" sz="1600" b="0" i="0" dirty="0">
-                <a:solidFill>
-                  <a:srgbClr val="333333"/>
-                </a:solidFill>
-                <a:effectLst/>
-                <a:latin typeface="Arial" panose="020B0604020202020204" pitchFamily="34" charset="0"/>
-                <a:cs typeface="Arial" panose="020B0604020202020204" pitchFamily="34" charset="0"/>
-              </a:rPr>
-              <a:t> duration: 0.004876950084407895 s</a:t>
+              <a:t>std of inter-sample duration: 0.004876950084407895 s</a:t>
             </a:r>
           </a:p>
           <a:p>
@@ -4410,29 +4388,7 @@
                 <a:latin typeface="Arial" panose="020B0604020202020204" pitchFamily="34" charset="0"/>
                 <a:cs typeface="Arial" panose="020B0604020202020204" pitchFamily="34" charset="0"/>
               </a:rPr>
-              <a:t>std of </a:t>
-            </a:r>
-            <a:r>
-              <a:rPr lang="en-US" sz="1600" b="0" i="0" dirty="0" err="1">
-                <a:solidFill>
-                  <a:srgbClr val="333333"/>
-                </a:solidFill>
-                <a:effectLst/>
-                <a:latin typeface="Arial" panose="020B0604020202020204" pitchFamily="34" charset="0"/>
-                <a:cs typeface="Arial" panose="020B0604020202020204" pitchFamily="34" charset="0"/>
-              </a:rPr>
-              <a:t>intersample</a:t>
-            </a:r>
-            <a:r>
-              <a:rPr lang="en-US" sz="1600" b="0" i="0" dirty="0">
-                <a:solidFill>
-                  <a:srgbClr val="333333"/>
-                </a:solidFill>
-                <a:effectLst/>
-                <a:latin typeface="Arial" panose="020B0604020202020204" pitchFamily="34" charset="0"/>
-                <a:cs typeface="Arial" panose="020B0604020202020204" pitchFamily="34" charset="0"/>
-              </a:rPr>
-              <a:t> duration:  6.284963455219297e-06 s</a:t>
+              <a:t>std of inter-sample duration:  6.284963455219297e-06 s</a:t>
             </a:r>
           </a:p>
           <a:p>

</xml_diff>